<commit_message>
Presentation title slide fix.
</commit_message>
<xml_diff>
--- a/1. JavaScript Basics/jsschool_basicsjs.pptx
+++ b/1. JavaScript Basics/jsschool_basicsjs.pptx
@@ -253,7 +253,7 @@
           <a:p>
             <a:fld id="{5B439031-0BF2-42EE-A111-32E398F72642}" type="datetimeFigureOut">
               <a:rPr lang="hr-HR" smtClean="0"/>
-              <a:t>13.03.2017</a:t>
+              <a:t>14.03.2017</a:t>
             </a:fld>
             <a:endParaRPr lang="hr-HR"/>
           </a:p>
@@ -652,7 +652,7 @@
           <a:p>
             <a:fld id="{1D8B35F5-AA5A-4391-A49E-03B177C59B30}" type="datetimeFigureOut">
               <a:rPr lang="hr-HR" smtClean="0"/>
-              <a:t>13.03.2017</a:t>
+              <a:t>14.03.2017</a:t>
             </a:fld>
             <a:endParaRPr lang="hr-HR"/>
           </a:p>
@@ -822,7 +822,7 @@
           <a:p>
             <a:fld id="{1D8B35F5-AA5A-4391-A49E-03B177C59B30}" type="datetimeFigureOut">
               <a:rPr lang="hr-HR" smtClean="0"/>
-              <a:t>13.03.2017</a:t>
+              <a:t>14.03.2017</a:t>
             </a:fld>
             <a:endParaRPr lang="hr-HR"/>
           </a:p>
@@ -1002,7 +1002,7 @@
           <a:p>
             <a:fld id="{1D8B35F5-AA5A-4391-A49E-03B177C59B30}" type="datetimeFigureOut">
               <a:rPr lang="hr-HR" smtClean="0"/>
-              <a:t>13.03.2017</a:t>
+              <a:t>14.03.2017</a:t>
             </a:fld>
             <a:endParaRPr lang="hr-HR"/>
           </a:p>
@@ -1173,7 +1173,7 @@
           <a:p>
             <a:fld id="{1D8B35F5-AA5A-4391-A49E-03B177C59B30}" type="datetimeFigureOut">
               <a:rPr lang="hr-HR" smtClean="0"/>
-              <a:t>13.03.2017</a:t>
+              <a:t>14.03.2017</a:t>
             </a:fld>
             <a:endParaRPr lang="hr-HR"/>
           </a:p>
@@ -1343,7 +1343,7 @@
           <a:p>
             <a:fld id="{1D8B35F5-AA5A-4391-A49E-03B177C59B30}" type="datetimeFigureOut">
               <a:rPr lang="hr-HR" smtClean="0"/>
-              <a:t>13.03.2017</a:t>
+              <a:t>14.03.2017</a:t>
             </a:fld>
             <a:endParaRPr lang="hr-HR"/>
           </a:p>
@@ -1589,7 +1589,7 @@
           <a:p>
             <a:fld id="{1D8B35F5-AA5A-4391-A49E-03B177C59B30}" type="datetimeFigureOut">
               <a:rPr lang="hr-HR" smtClean="0"/>
-              <a:t>13.03.2017</a:t>
+              <a:t>14.03.2017</a:t>
             </a:fld>
             <a:endParaRPr lang="hr-HR"/>
           </a:p>
@@ -1821,7 +1821,7 @@
           <a:p>
             <a:fld id="{1D8B35F5-AA5A-4391-A49E-03B177C59B30}" type="datetimeFigureOut">
               <a:rPr lang="hr-HR" smtClean="0"/>
-              <a:t>13.03.2017</a:t>
+              <a:t>14.03.2017</a:t>
             </a:fld>
             <a:endParaRPr lang="hr-HR"/>
           </a:p>
@@ -2188,7 +2188,7 @@
           <a:p>
             <a:fld id="{1D8B35F5-AA5A-4391-A49E-03B177C59B30}" type="datetimeFigureOut">
               <a:rPr lang="hr-HR" smtClean="0"/>
-              <a:t>13.03.2017</a:t>
+              <a:t>14.03.2017</a:t>
             </a:fld>
             <a:endParaRPr lang="hr-HR"/>
           </a:p>
@@ -2306,7 +2306,7 @@
           <a:p>
             <a:fld id="{1D8B35F5-AA5A-4391-A49E-03B177C59B30}" type="datetimeFigureOut">
               <a:rPr lang="hr-HR" smtClean="0"/>
-              <a:t>13.03.2017</a:t>
+              <a:t>14.03.2017</a:t>
             </a:fld>
             <a:endParaRPr lang="hr-HR"/>
           </a:p>
@@ -2477,7 +2477,7 @@
           <a:p>
             <a:fld id="{1D8B35F5-AA5A-4391-A49E-03B177C59B30}" type="datetimeFigureOut">
               <a:rPr lang="hr-HR" smtClean="0"/>
-              <a:t>13.03.2017</a:t>
+              <a:t>14.03.2017</a:t>
             </a:fld>
             <a:endParaRPr lang="hr-HR"/>
           </a:p>
@@ -2754,7 +2754,7 @@
           <a:p>
             <a:fld id="{1D8B35F5-AA5A-4391-A49E-03B177C59B30}" type="datetimeFigureOut">
               <a:rPr lang="hr-HR" smtClean="0"/>
-              <a:t>13.03.2017</a:t>
+              <a:t>14.03.2017</a:t>
             </a:fld>
             <a:endParaRPr lang="hr-HR"/>
           </a:p>
@@ -3011,7 +3011,7 @@
           <a:p>
             <a:fld id="{1D8B35F5-AA5A-4391-A49E-03B177C59B30}" type="datetimeFigureOut">
               <a:rPr lang="hr-HR" smtClean="0"/>
-              <a:t>13.03.2017</a:t>
+              <a:t>14.03.2017</a:t>
             </a:fld>
             <a:endParaRPr lang="hr-HR"/>
           </a:p>
@@ -3224,7 +3224,7 @@
           <a:p>
             <a:fld id="{1D8B35F5-AA5A-4391-A49E-03B177C59B30}" type="datetimeFigureOut">
               <a:rPr lang="hr-HR" smtClean="0"/>
-              <a:t>13.03.2017</a:t>
+              <a:t>14.03.2017</a:t>
             </a:fld>
             <a:endParaRPr lang="hr-HR"/>
           </a:p>
@@ -3699,13 +3699,10 @@
               <a:t> </a:t>
             </a:r>
             <a:r>
-              <a:rPr lang="en-US" sz="3600" dirty="0" err="1"/>
+              <a:rPr lang="en-US" sz="3600"/>
               <a:t>JavaSripta</a:t>
             </a:r>
-            <a:r>
-              <a:rPr lang="en-US" sz="3600" dirty="0"/>
-              <a:t>-a</a:t>
-            </a:r>
+            <a:endParaRPr lang="en-US" sz="3600" dirty="0"/>
           </a:p>
         </p:txBody>
       </p:sp>
@@ -17244,7 +17241,6 @@
               <a:rPr lang="hr-HR" dirty="0"/>
               <a:t>Serverske aplikacije s NodeJS</a:t>
             </a:r>
-            <a:endParaRPr lang="hr-HR" dirty="0"/>
           </a:p>
         </p:txBody>
       </p:sp>
@@ -17267,7 +17263,6 @@
               <a:rPr lang="hr-HR" dirty="0"/>
               <a:t>Next time...</a:t>
             </a:r>
-            <a:endParaRPr lang="hr-HR" dirty="0"/>
           </a:p>
         </p:txBody>
       </p:sp>

</xml_diff>